<commit_message>
Fix Documentation and Presentation
</commit_message>
<xml_diff>
--- a/Screening and selection of candidates.pptx
+++ b/Screening and selection of candidates.pptx
@@ -265,7 +265,7 @@
             <a:pPr rtl="0"/>
             <a:fld id="{2BD0C1A0-48AB-46A2-9DB3-50C1DD1F533C}" type="datetime1">
               <a:rPr lang="it-IT" smtClean="0"/>
-              <a:t>11/07/2023</a:t>
+              <a:t>02/08/2023</a:t>
             </a:fld>
             <a:endParaRPr lang="it-IT" dirty="0"/>
           </a:p>
@@ -447,7 +447,7 @@
             <a:fld id="{CE4E0239-3B87-47CD-94EA-3F4EA8D548B0}" type="datetime1">
               <a:rPr lang="it-IT" smtClean="0"/>
               <a:pPr/>
-              <a:t>11/07/2023</a:t>
+              <a:t>02/08/2023</a:t>
             </a:fld>
             <a:endParaRPr lang="it-IT" dirty="0"/>
           </a:p>
@@ -3423,7 +3423,7 @@
             <a:pPr rtl="0"/>
             <a:fld id="{89C4250E-64E0-4EC5-9213-BD7F5096714B}" type="datetime1">
               <a:rPr lang="it-IT" smtClean="0"/>
-              <a:t>11/07/2023</a:t>
+              <a:t>02/08/2023</a:t>
             </a:fld>
             <a:endParaRPr lang="it-IT" dirty="0"/>
           </a:p>
@@ -3645,7 +3645,7 @@
             <a:pPr rtl="0"/>
             <a:fld id="{E87AF9AB-A3C4-4A58-848E-CCA940ED1FEC}" type="datetime1">
               <a:rPr lang="it-IT" smtClean="0"/>
-              <a:t>11/07/2023</a:t>
+              <a:t>02/08/2023</a:t>
             </a:fld>
             <a:endParaRPr lang="it-IT" dirty="0"/>
           </a:p>
@@ -3877,7 +3877,7 @@
             <a:pPr rtl="0"/>
             <a:fld id="{B0700696-E469-4430-92A7-74A06E196FEF}" type="datetime1">
               <a:rPr lang="it-IT" smtClean="0"/>
-              <a:t>11/07/2023</a:t>
+              <a:t>02/08/2023</a:t>
             </a:fld>
             <a:endParaRPr lang="it-IT" dirty="0"/>
           </a:p>
@@ -4099,7 +4099,7 @@
             <a:pPr rtl="0"/>
             <a:fld id="{501DF7C0-CB4F-4166-9896-2E08801E7105}" type="datetime1">
               <a:rPr lang="it-IT" smtClean="0"/>
-              <a:t>11/07/2023</a:t>
+              <a:t>02/08/2023</a:t>
             </a:fld>
             <a:endParaRPr lang="it-IT" dirty="0"/>
           </a:p>
@@ -4390,7 +4390,7 @@
             <a:pPr rtl="0"/>
             <a:fld id="{1C37A476-6C85-410E-B777-333B8E74E898}" type="datetime1">
               <a:rPr lang="it-IT" smtClean="0"/>
-              <a:t>11/07/2023</a:t>
+              <a:t>02/08/2023</a:t>
             </a:fld>
             <a:endParaRPr lang="it-IT" dirty="0"/>
           </a:p>
@@ -4683,7 +4683,7 @@
             <a:pPr rtl="0"/>
             <a:fld id="{3E050F36-CC87-4833-84CE-1784AB20E5C5}" type="datetime1">
               <a:rPr lang="it-IT" smtClean="0"/>
-              <a:t>11/07/2023</a:t>
+              <a:t>02/08/2023</a:t>
             </a:fld>
             <a:endParaRPr lang="it-IT" dirty="0"/>
           </a:p>
@@ -5123,7 +5123,7 @@
             <a:pPr rtl="0"/>
             <a:fld id="{42326DD2-481D-43FC-9328-6B7AFF7F5383}" type="datetime1">
               <a:rPr lang="it-IT" smtClean="0"/>
-              <a:t>11/07/2023</a:t>
+              <a:t>02/08/2023</a:t>
             </a:fld>
             <a:endParaRPr lang="it-IT" dirty="0"/>
           </a:p>
@@ -5284,7 +5284,7 @@
             <a:pPr rtl="0"/>
             <a:fld id="{F9A68A72-CC0A-4348-9DED-22D956DE44F6}" type="datetime1">
               <a:rPr lang="it-IT" smtClean="0"/>
-              <a:t>11/07/2023</a:t>
+              <a:t>02/08/2023</a:t>
             </a:fld>
             <a:endParaRPr lang="it-IT" dirty="0"/>
           </a:p>
@@ -5412,7 +5412,7 @@
             <a:pPr rtl="0"/>
             <a:fld id="{BC6C72A8-E742-485B-937D-4D1041F1C0A0}" type="datetime1">
               <a:rPr lang="it-IT" smtClean="0"/>
-              <a:t>11/07/2023</a:t>
+              <a:t>02/08/2023</a:t>
             </a:fld>
             <a:endParaRPr lang="it-IT" dirty="0"/>
           </a:p>
@@ -5739,7 +5739,7 @@
             <a:pPr rtl="0"/>
             <a:fld id="{3F54ACDC-5125-40D7-A8C9-57C9B3849181}" type="datetime1">
               <a:rPr lang="it-IT" smtClean="0"/>
-              <a:t>11/07/2023</a:t>
+              <a:t>02/08/2023</a:t>
             </a:fld>
             <a:endParaRPr lang="it-IT" dirty="0"/>
           </a:p>
@@ -6047,7 +6047,7 @@
             <a:pPr rtl="0"/>
             <a:fld id="{E891265B-DBAA-4D87-A94A-0E214B1F8F78}" type="datetime1">
               <a:rPr lang="it-IT" smtClean="0"/>
-              <a:t>11/07/2023</a:t>
+              <a:t>02/08/2023</a:t>
             </a:fld>
             <a:endParaRPr lang="it-IT" dirty="0"/>
           </a:p>
@@ -6308,7 +6308,7 @@
             <a:pPr rtl="0"/>
             <a:fld id="{948C05A5-518F-4B2A-9C12-BB199F81A7AA}" type="datetime1">
               <a:rPr lang="it-IT" smtClean="0"/>
-              <a:t>11/07/2023</a:t>
+              <a:t>02/08/2023</a:t>
             </a:fld>
             <a:endParaRPr lang="it-IT" dirty="0"/>
           </a:p>
@@ -22109,6 +22109,36 @@
           </a:p>
         </p:txBody>
       </p:sp>
+      <p:pic>
+        <p:nvPicPr>
+          <p:cNvPr id="13" name="Immagine 12">
+            <a:extLst>
+              <a:ext uri="{FF2B5EF4-FFF2-40B4-BE49-F238E27FC236}">
+                <a16:creationId xmlns:a16="http://schemas.microsoft.com/office/drawing/2014/main" id="{30FB1216-F6E0-0927-3A93-6A3A75389537}"/>
+              </a:ext>
+            </a:extLst>
+          </p:cNvPr>
+          <p:cNvPicPr>
+            <a:picLocks noChangeAspect="1"/>
+          </p:cNvPicPr>
+          <p:nvPr/>
+        </p:nvPicPr>
+        <p:blipFill>
+          <a:blip r:embed="rId6"/>
+          <a:stretch>
+            <a:fillRect/>
+          </a:stretch>
+        </p:blipFill>
+        <p:spPr>
+          <a:xfrm>
+            <a:off x="2490786" y="2542118"/>
+            <a:ext cx="7762875" cy="828675"/>
+          </a:xfrm>
+          <a:prstGeom prst="rect">
+            <a:avLst/>
+          </a:prstGeom>
+        </p:spPr>
+      </p:pic>
     </p:spTree>
     <p:extLst>
       <p:ext uri="{BB962C8B-B14F-4D97-AF65-F5344CB8AC3E}">
@@ -38728,6 +38758,15 @@
 </file>
 
 <file path=customXml/item1.xml><?xml version="1.0" encoding="utf-8"?>
+<?mso-contentType ?>
+<FormTemplates xmlns="http://schemas.microsoft.com/sharepoint/v3/contenttype/forms">
+  <Display>DocumentLibraryForm</Display>
+  <Edit>DocumentLibraryForm</Edit>
+  <New>DocumentLibraryForm</New>
+</FormTemplates>
+</file>
+
+<file path=customXml/item2.xml><?xml version="1.0" encoding="utf-8"?>
 <ct:contentTypeSchema xmlns:ct="http://schemas.microsoft.com/office/2006/metadata/contentType" xmlns:ma="http://schemas.microsoft.com/office/2006/metadata/properties/metaAttributes" ct:_="" ma:_="" ma:contentTypeName="Document" ma:contentTypeID="0x01010079F111ED35F8CC479449609E8A0923A6" ma:contentTypeVersion="24" ma:contentTypeDescription="Create a new document." ma:contentTypeScope="" ma:versionID="2d714a3296df14eba7a100bb665443ca">
   <xsd:schema xmlns:xsd="http://www.w3.org/2001/XMLSchema" xmlns:xs="http://www.w3.org/2001/XMLSchema" xmlns:p="http://schemas.microsoft.com/office/2006/metadata/properties" xmlns:ns1="http://schemas.microsoft.com/sharepoint/v3" xmlns:ns2="71af3243-3dd4-4a8d-8c0d-dd76da1f02a5" xmlns:ns3="16c05727-aa75-4e4a-9b5f-8a80a1165891" xmlns:ns4="230e9df3-be65-4c73-a93b-d1236ebd677e" targetNamespace="http://schemas.microsoft.com/office/2006/metadata/properties" ma:root="true" ma:fieldsID="49549bf45bfbbfb6cffed527380e77e1" ns1:_="" ns2:_="" ns3:_="" ns4:_="">
     <xsd:import namespace="http://schemas.microsoft.com/sharepoint/v3"/>
@@ -39015,15 +39054,6 @@
 </ct:contentTypeSchema>
 </file>
 
-<file path=customXml/item2.xml><?xml version="1.0" encoding="utf-8"?>
-<?mso-contentType ?>
-<FormTemplates xmlns="http://schemas.microsoft.com/sharepoint/v3/contenttype/forms">
-  <Display>DocumentLibraryForm</Display>
-  <Edit>DocumentLibraryForm</Edit>
-  <New>DocumentLibraryForm</New>
-</FormTemplates>
-</file>
-
 <file path=customXml/item3.xml><?xml version="1.0" encoding="utf-8"?>
 <p:properties xmlns:p="http://schemas.microsoft.com/office/2006/metadata/properties" xmlns:xsi="http://www.w3.org/2001/XMLSchema-instance" xmlns:pc="http://schemas.microsoft.com/office/infopath/2007/PartnerControls">
   <documentManagement>
@@ -39045,6 +39075,14 @@
 </file>
 
 <file path=customXml/itemProps1.xml><?xml version="1.0" encoding="utf-8"?>
+<ds:datastoreItem xmlns:ds="http://schemas.openxmlformats.org/officeDocument/2006/customXml" ds:itemID="{3516AB37-D7B9-4507-B21E-5D459905C6C0}">
+  <ds:schemaRefs>
+    <ds:schemaRef ds:uri="http://schemas.microsoft.com/sharepoint/v3/contenttype/forms"/>
+  </ds:schemaRefs>
+</ds:datastoreItem>
+</file>
+
+<file path=customXml/itemProps2.xml><?xml version="1.0" encoding="utf-8"?>
 <ds:datastoreItem xmlns:ds="http://schemas.openxmlformats.org/officeDocument/2006/customXml" ds:itemID="{0AA17EA8-7A9B-4350-B9C2-AA100F76C2EB}">
   <ds:schemaRefs>
     <ds:schemaRef ds:uri="http://schemas.microsoft.com/office/2006/metadata/contentType"/>
@@ -39065,14 +39103,6 @@
 </ds:datastoreItem>
 </file>
 
-<file path=customXml/itemProps2.xml><?xml version="1.0" encoding="utf-8"?>
-<ds:datastoreItem xmlns:ds="http://schemas.openxmlformats.org/officeDocument/2006/customXml" ds:itemID="{3516AB37-D7B9-4507-B21E-5D459905C6C0}">
-  <ds:schemaRefs>
-    <ds:schemaRef ds:uri="http://schemas.microsoft.com/sharepoint/v3/contenttype/forms"/>
-  </ds:schemaRefs>
-</ds:datastoreItem>
-</file>
-
 <file path=customXml/itemProps3.xml><?xml version="1.0" encoding="utf-8"?>
 <ds:datastoreItem xmlns:ds="http://schemas.openxmlformats.org/officeDocument/2006/customXml" ds:itemID="{FE40622C-5D03-4258-98D9-CB4F18C7FADE}">
   <ds:schemaRefs>

</xml_diff>